<commit_message>
Minor updates in some R functions
</commit_message>
<xml_diff>
--- a/Documents/FlowChart.pptx
+++ b/Documents/FlowChart.pptx
@@ -154,7 +154,7 @@
           </a:lstStyle>
           <a:p>
             <a:r>
-              <a:rPr lang="en-US" smtClean="0"/>
+              <a:rPr lang="en-US"/>
               <a:t>Click to edit Master title style</a:t>
             </a:r>
             <a:endParaRPr lang="en-US" dirty="0"/>
@@ -219,7 +219,7 @@
           </a:lstStyle>
           <a:p>
             <a:r>
-              <a:rPr lang="en-US" smtClean="0"/>
+              <a:rPr lang="en-US"/>
               <a:t>Click to edit Master subtitle style</a:t>
             </a:r>
             <a:endParaRPr lang="en-US" dirty="0"/>
@@ -243,7 +243,7 @@
           <a:p>
             <a:fld id="{C6F1681A-2F02-40D5-AEEF-A7A9C04C2CD7}" type="datetimeFigureOut">
               <a:rPr lang="en-GB" smtClean="0"/>
-              <a:t>11/11/2021</a:t>
+              <a:t>14/06/2022</a:t>
             </a:fld>
             <a:endParaRPr lang="en-GB"/>
           </a:p>
@@ -337,7 +337,7 @@
           <a:lstStyle/>
           <a:p>
             <a:r>
-              <a:rPr lang="en-US" smtClean="0"/>
+              <a:rPr lang="en-US"/>
               <a:t>Click to edit Master title style</a:t>
             </a:r>
             <a:endParaRPr lang="en-US" dirty="0"/>
@@ -361,35 +361,35 @@
           <a:p>
             <a:pPr lvl="0"/>
             <a:r>
-              <a:rPr lang="en-US" smtClean="0"/>
+              <a:rPr lang="en-US"/>
               <a:t>Edit Master text styles</a:t>
             </a:r>
           </a:p>
           <a:p>
             <a:pPr lvl="1"/>
             <a:r>
-              <a:rPr lang="en-US" smtClean="0"/>
+              <a:rPr lang="en-US"/>
               <a:t>Second level</a:t>
             </a:r>
           </a:p>
           <a:p>
             <a:pPr lvl="2"/>
             <a:r>
-              <a:rPr lang="en-US" smtClean="0"/>
+              <a:rPr lang="en-US"/>
               <a:t>Third level</a:t>
             </a:r>
           </a:p>
           <a:p>
             <a:pPr lvl="3"/>
             <a:r>
-              <a:rPr lang="en-US" smtClean="0"/>
+              <a:rPr lang="en-US"/>
               <a:t>Fourth level</a:t>
             </a:r>
           </a:p>
           <a:p>
             <a:pPr lvl="4"/>
             <a:r>
-              <a:rPr lang="en-US" smtClean="0"/>
+              <a:rPr lang="en-US"/>
               <a:t>Fifth level</a:t>
             </a:r>
             <a:endParaRPr lang="en-US" dirty="0"/>
@@ -413,7 +413,7 @@
           <a:p>
             <a:fld id="{C6F1681A-2F02-40D5-AEEF-A7A9C04C2CD7}" type="datetimeFigureOut">
               <a:rPr lang="en-GB" smtClean="0"/>
-              <a:t>11/11/2021</a:t>
+              <a:t>14/06/2022</a:t>
             </a:fld>
             <a:endParaRPr lang="en-GB"/>
           </a:p>
@@ -512,7 +512,7 @@
           <a:lstStyle/>
           <a:p>
             <a:r>
-              <a:rPr lang="en-US" smtClean="0"/>
+              <a:rPr lang="en-US"/>
               <a:t>Click to edit Master title style</a:t>
             </a:r>
             <a:endParaRPr lang="en-US" dirty="0"/>
@@ -541,35 +541,35 @@
           <a:p>
             <a:pPr lvl="0"/>
             <a:r>
-              <a:rPr lang="en-US" smtClean="0"/>
+              <a:rPr lang="en-US"/>
               <a:t>Edit Master text styles</a:t>
             </a:r>
           </a:p>
           <a:p>
             <a:pPr lvl="1"/>
             <a:r>
-              <a:rPr lang="en-US" smtClean="0"/>
+              <a:rPr lang="en-US"/>
               <a:t>Second level</a:t>
             </a:r>
           </a:p>
           <a:p>
             <a:pPr lvl="2"/>
             <a:r>
-              <a:rPr lang="en-US" smtClean="0"/>
+              <a:rPr lang="en-US"/>
               <a:t>Third level</a:t>
             </a:r>
           </a:p>
           <a:p>
             <a:pPr lvl="3"/>
             <a:r>
-              <a:rPr lang="en-US" smtClean="0"/>
+              <a:rPr lang="en-US"/>
               <a:t>Fourth level</a:t>
             </a:r>
           </a:p>
           <a:p>
             <a:pPr lvl="4"/>
             <a:r>
-              <a:rPr lang="en-US" smtClean="0"/>
+              <a:rPr lang="en-US"/>
               <a:t>Fifth level</a:t>
             </a:r>
             <a:endParaRPr lang="en-US" dirty="0"/>
@@ -593,7 +593,7 @@
           <a:p>
             <a:fld id="{C6F1681A-2F02-40D5-AEEF-A7A9C04C2CD7}" type="datetimeFigureOut">
               <a:rPr lang="en-GB" smtClean="0"/>
-              <a:t>11/11/2021</a:t>
+              <a:t>14/06/2022</a:t>
             </a:fld>
             <a:endParaRPr lang="en-GB"/>
           </a:p>
@@ -687,7 +687,7 @@
           <a:lstStyle/>
           <a:p>
             <a:r>
-              <a:rPr lang="en-US" smtClean="0"/>
+              <a:rPr lang="en-US"/>
               <a:t>Click to edit Master title style</a:t>
             </a:r>
             <a:endParaRPr lang="en-US" dirty="0"/>
@@ -711,35 +711,35 @@
           <a:p>
             <a:pPr lvl="0"/>
             <a:r>
-              <a:rPr lang="en-US" smtClean="0"/>
+              <a:rPr lang="en-US"/>
               <a:t>Edit Master text styles</a:t>
             </a:r>
           </a:p>
           <a:p>
             <a:pPr lvl="1"/>
             <a:r>
-              <a:rPr lang="en-US" smtClean="0"/>
+              <a:rPr lang="en-US"/>
               <a:t>Second level</a:t>
             </a:r>
           </a:p>
           <a:p>
             <a:pPr lvl="2"/>
             <a:r>
-              <a:rPr lang="en-US" smtClean="0"/>
+              <a:rPr lang="en-US"/>
               <a:t>Third level</a:t>
             </a:r>
           </a:p>
           <a:p>
             <a:pPr lvl="3"/>
             <a:r>
-              <a:rPr lang="en-US" smtClean="0"/>
+              <a:rPr lang="en-US"/>
               <a:t>Fourth level</a:t>
             </a:r>
           </a:p>
           <a:p>
             <a:pPr lvl="4"/>
             <a:r>
-              <a:rPr lang="en-US" smtClean="0"/>
+              <a:rPr lang="en-US"/>
               <a:t>Fifth level</a:t>
             </a:r>
             <a:endParaRPr lang="en-US" dirty="0"/>
@@ -763,7 +763,7 @@
           <a:p>
             <a:fld id="{C6F1681A-2F02-40D5-AEEF-A7A9C04C2CD7}" type="datetimeFigureOut">
               <a:rPr lang="en-GB" smtClean="0"/>
-              <a:t>11/11/2021</a:t>
+              <a:t>14/06/2022</a:t>
             </a:fld>
             <a:endParaRPr lang="en-GB"/>
           </a:p>
@@ -866,7 +866,7 @@
           </a:lstStyle>
           <a:p>
             <a:r>
-              <a:rPr lang="en-US" smtClean="0"/>
+              <a:rPr lang="en-US"/>
               <a:t>Click to edit Master title style</a:t>
             </a:r>
             <a:endParaRPr lang="en-US" dirty="0"/>
@@ -984,7 +984,7 @@
           <a:p>
             <a:pPr lvl="0"/>
             <a:r>
-              <a:rPr lang="en-US" smtClean="0"/>
+              <a:rPr lang="en-US"/>
               <a:t>Edit Master text styles</a:t>
             </a:r>
           </a:p>
@@ -1007,7 +1007,7 @@
           <a:p>
             <a:fld id="{C6F1681A-2F02-40D5-AEEF-A7A9C04C2CD7}" type="datetimeFigureOut">
               <a:rPr lang="en-GB" smtClean="0"/>
-              <a:t>11/11/2021</a:t>
+              <a:t>14/06/2022</a:t>
             </a:fld>
             <a:endParaRPr lang="en-GB"/>
           </a:p>
@@ -1101,7 +1101,7 @@
           <a:lstStyle/>
           <a:p>
             <a:r>
-              <a:rPr lang="en-US" smtClean="0"/>
+              <a:rPr lang="en-US"/>
               <a:t>Click to edit Master title style</a:t>
             </a:r>
             <a:endParaRPr lang="en-US" dirty="0"/>
@@ -1130,35 +1130,35 @@
           <a:p>
             <a:pPr lvl="0"/>
             <a:r>
-              <a:rPr lang="en-US" smtClean="0"/>
+              <a:rPr lang="en-US"/>
               <a:t>Edit Master text styles</a:t>
             </a:r>
           </a:p>
           <a:p>
             <a:pPr lvl="1"/>
             <a:r>
-              <a:rPr lang="en-US" smtClean="0"/>
+              <a:rPr lang="en-US"/>
               <a:t>Second level</a:t>
             </a:r>
           </a:p>
           <a:p>
             <a:pPr lvl="2"/>
             <a:r>
-              <a:rPr lang="en-US" smtClean="0"/>
+              <a:rPr lang="en-US"/>
               <a:t>Third level</a:t>
             </a:r>
           </a:p>
           <a:p>
             <a:pPr lvl="3"/>
             <a:r>
-              <a:rPr lang="en-US" smtClean="0"/>
+              <a:rPr lang="en-US"/>
               <a:t>Fourth level</a:t>
             </a:r>
           </a:p>
           <a:p>
             <a:pPr lvl="4"/>
             <a:r>
-              <a:rPr lang="en-US" smtClean="0"/>
+              <a:rPr lang="en-US"/>
               <a:t>Fifth level</a:t>
             </a:r>
             <a:endParaRPr lang="en-US" dirty="0"/>
@@ -1187,35 +1187,35 @@
           <a:p>
             <a:pPr lvl="0"/>
             <a:r>
-              <a:rPr lang="en-US" smtClean="0"/>
+              <a:rPr lang="en-US"/>
               <a:t>Edit Master text styles</a:t>
             </a:r>
           </a:p>
           <a:p>
             <a:pPr lvl="1"/>
             <a:r>
-              <a:rPr lang="en-US" smtClean="0"/>
+              <a:rPr lang="en-US"/>
               <a:t>Second level</a:t>
             </a:r>
           </a:p>
           <a:p>
             <a:pPr lvl="2"/>
             <a:r>
-              <a:rPr lang="en-US" smtClean="0"/>
+              <a:rPr lang="en-US"/>
               <a:t>Third level</a:t>
             </a:r>
           </a:p>
           <a:p>
             <a:pPr lvl="3"/>
             <a:r>
-              <a:rPr lang="en-US" smtClean="0"/>
+              <a:rPr lang="en-US"/>
               <a:t>Fourth level</a:t>
             </a:r>
           </a:p>
           <a:p>
             <a:pPr lvl="4"/>
             <a:r>
-              <a:rPr lang="en-US" smtClean="0"/>
+              <a:rPr lang="en-US"/>
               <a:t>Fifth level</a:t>
             </a:r>
             <a:endParaRPr lang="en-US" dirty="0"/>
@@ -1239,7 +1239,7 @@
           <a:p>
             <a:fld id="{C6F1681A-2F02-40D5-AEEF-A7A9C04C2CD7}" type="datetimeFigureOut">
               <a:rPr lang="en-GB" smtClean="0"/>
-              <a:t>11/11/2021</a:t>
+              <a:t>14/06/2022</a:t>
             </a:fld>
             <a:endParaRPr lang="en-GB"/>
           </a:p>
@@ -1338,7 +1338,7 @@
           <a:lstStyle/>
           <a:p>
             <a:r>
-              <a:rPr lang="en-US" smtClean="0"/>
+              <a:rPr lang="en-US"/>
               <a:t>Click to edit Master title style</a:t>
             </a:r>
             <a:endParaRPr lang="en-US" dirty="0"/>
@@ -1404,7 +1404,7 @@
           <a:p>
             <a:pPr lvl="0"/>
             <a:r>
-              <a:rPr lang="en-US" smtClean="0"/>
+              <a:rPr lang="en-US"/>
               <a:t>Edit Master text styles</a:t>
             </a:r>
           </a:p>
@@ -1432,35 +1432,35 @@
           <a:p>
             <a:pPr lvl="0"/>
             <a:r>
-              <a:rPr lang="en-US" smtClean="0"/>
+              <a:rPr lang="en-US"/>
               <a:t>Edit Master text styles</a:t>
             </a:r>
           </a:p>
           <a:p>
             <a:pPr lvl="1"/>
             <a:r>
-              <a:rPr lang="en-US" smtClean="0"/>
+              <a:rPr lang="en-US"/>
               <a:t>Second level</a:t>
             </a:r>
           </a:p>
           <a:p>
             <a:pPr lvl="2"/>
             <a:r>
-              <a:rPr lang="en-US" smtClean="0"/>
+              <a:rPr lang="en-US"/>
               <a:t>Third level</a:t>
             </a:r>
           </a:p>
           <a:p>
             <a:pPr lvl="3"/>
             <a:r>
-              <a:rPr lang="en-US" smtClean="0"/>
+              <a:rPr lang="en-US"/>
               <a:t>Fourth level</a:t>
             </a:r>
           </a:p>
           <a:p>
             <a:pPr lvl="4"/>
             <a:r>
-              <a:rPr lang="en-US" smtClean="0"/>
+              <a:rPr lang="en-US"/>
               <a:t>Fifth level</a:t>
             </a:r>
             <a:endParaRPr lang="en-US" dirty="0"/>
@@ -1526,7 +1526,7 @@
           <a:p>
             <a:pPr lvl="0"/>
             <a:r>
-              <a:rPr lang="en-US" smtClean="0"/>
+              <a:rPr lang="en-US"/>
               <a:t>Edit Master text styles</a:t>
             </a:r>
           </a:p>
@@ -1554,35 +1554,35 @@
           <a:p>
             <a:pPr lvl="0"/>
             <a:r>
-              <a:rPr lang="en-US" smtClean="0"/>
+              <a:rPr lang="en-US"/>
               <a:t>Edit Master text styles</a:t>
             </a:r>
           </a:p>
           <a:p>
             <a:pPr lvl="1"/>
             <a:r>
-              <a:rPr lang="en-US" smtClean="0"/>
+              <a:rPr lang="en-US"/>
               <a:t>Second level</a:t>
             </a:r>
           </a:p>
           <a:p>
             <a:pPr lvl="2"/>
             <a:r>
-              <a:rPr lang="en-US" smtClean="0"/>
+              <a:rPr lang="en-US"/>
               <a:t>Third level</a:t>
             </a:r>
           </a:p>
           <a:p>
             <a:pPr lvl="3"/>
             <a:r>
-              <a:rPr lang="en-US" smtClean="0"/>
+              <a:rPr lang="en-US"/>
               <a:t>Fourth level</a:t>
             </a:r>
           </a:p>
           <a:p>
             <a:pPr lvl="4"/>
             <a:r>
-              <a:rPr lang="en-US" smtClean="0"/>
+              <a:rPr lang="en-US"/>
               <a:t>Fifth level</a:t>
             </a:r>
             <a:endParaRPr lang="en-US" dirty="0"/>
@@ -1606,7 +1606,7 @@
           <a:p>
             <a:fld id="{C6F1681A-2F02-40D5-AEEF-A7A9C04C2CD7}" type="datetimeFigureOut">
               <a:rPr lang="en-GB" smtClean="0"/>
-              <a:t>11/11/2021</a:t>
+              <a:t>14/06/2022</a:t>
             </a:fld>
             <a:endParaRPr lang="en-GB"/>
           </a:p>
@@ -1700,7 +1700,7 @@
           <a:lstStyle/>
           <a:p>
             <a:r>
-              <a:rPr lang="en-US" smtClean="0"/>
+              <a:rPr lang="en-US"/>
               <a:t>Click to edit Master title style</a:t>
             </a:r>
             <a:endParaRPr lang="en-US" dirty="0"/>
@@ -1724,7 +1724,7 @@
           <a:p>
             <a:fld id="{C6F1681A-2F02-40D5-AEEF-A7A9C04C2CD7}" type="datetimeFigureOut">
               <a:rPr lang="en-GB" smtClean="0"/>
-              <a:t>11/11/2021</a:t>
+              <a:t>14/06/2022</a:t>
             </a:fld>
             <a:endParaRPr lang="en-GB"/>
           </a:p>
@@ -1819,7 +1819,7 @@
           <a:p>
             <a:fld id="{C6F1681A-2F02-40D5-AEEF-A7A9C04C2CD7}" type="datetimeFigureOut">
               <a:rPr lang="en-GB" smtClean="0"/>
-              <a:t>11/11/2021</a:t>
+              <a:t>14/06/2022</a:t>
             </a:fld>
             <a:endParaRPr lang="en-GB"/>
           </a:p>
@@ -1922,7 +1922,7 @@
           </a:lstStyle>
           <a:p>
             <a:r>
-              <a:rPr lang="en-US" smtClean="0"/>
+              <a:rPr lang="en-US"/>
               <a:t>Click to edit Master title style</a:t>
             </a:r>
             <a:endParaRPr lang="en-US" dirty="0"/>
@@ -1979,35 +1979,35 @@
           <a:p>
             <a:pPr lvl="0"/>
             <a:r>
-              <a:rPr lang="en-US" smtClean="0"/>
+              <a:rPr lang="en-US"/>
               <a:t>Edit Master text styles</a:t>
             </a:r>
           </a:p>
           <a:p>
             <a:pPr lvl="1"/>
             <a:r>
-              <a:rPr lang="en-US" smtClean="0"/>
+              <a:rPr lang="en-US"/>
               <a:t>Second level</a:t>
             </a:r>
           </a:p>
           <a:p>
             <a:pPr lvl="2"/>
             <a:r>
-              <a:rPr lang="en-US" smtClean="0"/>
+              <a:rPr lang="en-US"/>
               <a:t>Third level</a:t>
             </a:r>
           </a:p>
           <a:p>
             <a:pPr lvl="3"/>
             <a:r>
-              <a:rPr lang="en-US" smtClean="0"/>
+              <a:rPr lang="en-US"/>
               <a:t>Fourth level</a:t>
             </a:r>
           </a:p>
           <a:p>
             <a:pPr lvl="4"/>
             <a:r>
-              <a:rPr lang="en-US" smtClean="0"/>
+              <a:rPr lang="en-US"/>
               <a:t>Fifth level</a:t>
             </a:r>
             <a:endParaRPr lang="en-US" dirty="0"/>
@@ -2073,7 +2073,7 @@
           <a:p>
             <a:pPr lvl="0"/>
             <a:r>
-              <a:rPr lang="en-US" smtClean="0"/>
+              <a:rPr lang="en-US"/>
               <a:t>Edit Master text styles</a:t>
             </a:r>
           </a:p>
@@ -2096,7 +2096,7 @@
           <a:p>
             <a:fld id="{C6F1681A-2F02-40D5-AEEF-A7A9C04C2CD7}" type="datetimeFigureOut">
               <a:rPr lang="en-GB" smtClean="0"/>
-              <a:t>11/11/2021</a:t>
+              <a:t>14/06/2022</a:t>
             </a:fld>
             <a:endParaRPr lang="en-GB"/>
           </a:p>
@@ -2199,7 +2199,7 @@
           </a:lstStyle>
           <a:p>
             <a:r>
-              <a:rPr lang="en-US" smtClean="0"/>
+              <a:rPr lang="en-US"/>
               <a:t>Click to edit Master title style</a:t>
             </a:r>
             <a:endParaRPr lang="en-US" dirty="0"/>
@@ -2264,7 +2264,7 @@
           </a:lstStyle>
           <a:p>
             <a:r>
-              <a:rPr lang="en-US" smtClean="0"/>
+              <a:rPr lang="en-US"/>
               <a:t>Click icon to add picture</a:t>
             </a:r>
             <a:endParaRPr lang="en-US" dirty="0"/>
@@ -2330,7 +2330,7 @@
           <a:p>
             <a:pPr lvl="0"/>
             <a:r>
-              <a:rPr lang="en-US" smtClean="0"/>
+              <a:rPr lang="en-US"/>
               <a:t>Edit Master text styles</a:t>
             </a:r>
           </a:p>
@@ -2353,7 +2353,7 @@
           <a:p>
             <a:fld id="{C6F1681A-2F02-40D5-AEEF-A7A9C04C2CD7}" type="datetimeFigureOut">
               <a:rPr lang="en-GB" smtClean="0"/>
-              <a:t>11/11/2021</a:t>
+              <a:t>14/06/2022</a:t>
             </a:fld>
             <a:endParaRPr lang="en-GB"/>
           </a:p>
@@ -2462,7 +2462,7 @@
           <a:lstStyle/>
           <a:p>
             <a:r>
-              <a:rPr lang="en-US" smtClean="0"/>
+              <a:rPr lang="en-US"/>
               <a:t>Click to edit Master title style</a:t>
             </a:r>
             <a:endParaRPr lang="en-US" dirty="0"/>
@@ -2496,35 +2496,35 @@
           <a:p>
             <a:pPr lvl="0"/>
             <a:r>
-              <a:rPr lang="en-US" smtClean="0"/>
+              <a:rPr lang="en-US"/>
               <a:t>Edit Master text styles</a:t>
             </a:r>
           </a:p>
           <a:p>
             <a:pPr lvl="1"/>
             <a:r>
-              <a:rPr lang="en-US" smtClean="0"/>
+              <a:rPr lang="en-US"/>
               <a:t>Second level</a:t>
             </a:r>
           </a:p>
           <a:p>
             <a:pPr lvl="2"/>
             <a:r>
-              <a:rPr lang="en-US" smtClean="0"/>
+              <a:rPr lang="en-US"/>
               <a:t>Third level</a:t>
             </a:r>
           </a:p>
           <a:p>
             <a:pPr lvl="3"/>
             <a:r>
-              <a:rPr lang="en-US" smtClean="0"/>
+              <a:rPr lang="en-US"/>
               <a:t>Fourth level</a:t>
             </a:r>
           </a:p>
           <a:p>
             <a:pPr lvl="4"/>
             <a:r>
-              <a:rPr lang="en-US" smtClean="0"/>
+              <a:rPr lang="en-US"/>
               <a:t>Fifth level</a:t>
             </a:r>
             <a:endParaRPr lang="en-US" dirty="0"/>
@@ -2566,7 +2566,7 @@
           <a:p>
             <a:fld id="{C6F1681A-2F02-40D5-AEEF-A7A9C04C2CD7}" type="datetimeFigureOut">
               <a:rPr lang="en-GB" smtClean="0"/>
-              <a:t>11/11/2021</a:t>
+              <a:t>14/06/2022</a:t>
             </a:fld>
             <a:endParaRPr lang="en-GB"/>
           </a:p>
@@ -3015,18 +3015,13 @@
           <a:p>
             <a:pPr algn="ctr"/>
             <a:r>
-              <a:rPr lang="en-GB" sz="1200" dirty="0" smtClean="0">
+              <a:rPr lang="en-GB" sz="1200" dirty="0">
                 <a:solidFill>
                   <a:schemeClr val="tx1"/>
                 </a:solidFill>
               </a:rPr>
               <a:t>Quantify Model Discrepancy (MD) and Observational Error (OE)</a:t>
             </a:r>
-            <a:endParaRPr lang="en-GB" sz="1200" dirty="0">
-              <a:solidFill>
-                <a:schemeClr val="tx1"/>
-              </a:solidFill>
-            </a:endParaRPr>
           </a:p>
         </p:txBody>
       </p:sp>
@@ -3182,7 +3177,7 @@
           <a:lstStyle/>
           <a:p>
             <a:pPr algn="ctr"/>
-            <a:endParaRPr lang="en-GB" sz="1000" dirty="0" smtClean="0">
+            <a:endParaRPr lang="en-GB" sz="1000" dirty="0">
               <a:solidFill>
                 <a:schemeClr val="tx1"/>
               </a:solidFill>
@@ -3214,7 +3209,7 @@
           <a:p>
             <a:pPr algn="ctr"/>
             <a:r>
-              <a:rPr lang="en-GB" sz="900" dirty="0" smtClean="0"/>
+              <a:rPr lang="en-GB" sz="900" dirty="0"/>
               <a:t>Run the model to </a:t>
             </a:r>
           </a:p>
@@ -3222,13 +3217,8 @@
             <a:pPr algn="ctr"/>
             <a:r>
               <a:rPr lang="en-GB" sz="900" dirty="0"/>
-              <a:t>c</a:t>
-            </a:r>
-            <a:r>
-              <a:rPr lang="en-GB" sz="900" dirty="0" smtClean="0"/>
-              <a:t>reate basis for statistical surrogate (emulator)</a:t>
-            </a:r>
-            <a:endParaRPr lang="en-GB" sz="900" dirty="0"/>
+              <a:t>create basis for statistical surrogate (emulator)</a:t>
+            </a:r>
           </a:p>
         </p:txBody>
       </p:sp>
@@ -3282,7 +3272,7 @@
           <a:lstStyle/>
           <a:p>
             <a:pPr algn="ctr"/>
-            <a:endParaRPr lang="en-GB" sz="1000" dirty="0" smtClean="0">
+            <a:endParaRPr lang="en-GB" sz="1000" dirty="0">
               <a:solidFill>
                 <a:schemeClr val="tx1"/>
               </a:solidFill>
@@ -3314,10 +3304,9 @@
           <a:p>
             <a:pPr algn="ctr"/>
             <a:r>
-              <a:rPr lang="en-GB" sz="900" dirty="0" smtClean="0"/>
+              <a:rPr lang="en-GB" sz="900" dirty="0"/>
               <a:t>Obtain instantaneous predictions of model output</a:t>
             </a:r>
-            <a:endParaRPr lang="en-GB" sz="900" dirty="0"/>
           </a:p>
         </p:txBody>
       </p:sp>
@@ -3369,18 +3358,13 @@
           <a:p>
             <a:pPr algn="ctr"/>
             <a:r>
-              <a:rPr lang="en-GB" sz="1200" dirty="0" smtClean="0">
+              <a:rPr lang="en-GB" sz="1200" dirty="0">
                 <a:solidFill>
                   <a:schemeClr val="tx1"/>
                 </a:solidFill>
               </a:rPr>
               <a:t>Compute implausibility measure over the space of interest</a:t>
             </a:r>
-            <a:endParaRPr lang="en-GB" sz="1200" dirty="0">
-              <a:solidFill>
-                <a:schemeClr val="tx1"/>
-              </a:solidFill>
-            </a:endParaRPr>
           </a:p>
         </p:txBody>
       </p:sp>
@@ -3432,18 +3416,13 @@
           <a:p>
             <a:pPr algn="ctr"/>
             <a:r>
-              <a:rPr lang="en-GB" sz="1200" dirty="0" smtClean="0">
+              <a:rPr lang="en-GB" sz="1200" dirty="0">
                 <a:solidFill>
                   <a:schemeClr val="tx1"/>
                 </a:solidFill>
               </a:rPr>
               <a:t>Rule out input-space regions where match is implausible</a:t>
             </a:r>
-            <a:endParaRPr lang="en-GB" sz="1200" dirty="0">
-              <a:solidFill>
-                <a:schemeClr val="tx1"/>
-              </a:solidFill>
-            </a:endParaRPr>
           </a:p>
         </p:txBody>
       </p:sp>
@@ -3522,17 +3501,16 @@
           <a:p>
             <a:pPr algn="ctr"/>
             <a:r>
-              <a:rPr lang="en-GB" sz="1200" dirty="0" smtClean="0"/>
+              <a:rPr lang="en-GB" sz="1200" dirty="0"/>
               <a:t>Emulator uncertainty small compared to </a:t>
             </a:r>
           </a:p>
           <a:p>
             <a:pPr algn="ctr"/>
             <a:r>
-              <a:rPr lang="en-GB" sz="1200" dirty="0" smtClean="0"/>
+              <a:rPr lang="en-GB" sz="1200" dirty="0"/>
               <a:t>MD &amp; OE?</a:t>
             </a:r>
-            <a:endParaRPr lang="en-GB" sz="1200" dirty="0"/>
           </a:p>
         </p:txBody>
       </p:sp>
@@ -3586,18 +3564,13 @@
           <a:p>
             <a:pPr algn="ctr"/>
             <a:r>
-              <a:rPr lang="en-GB" dirty="0" smtClean="0">
+              <a:rPr lang="en-GB" dirty="0">
                 <a:solidFill>
                   <a:schemeClr val="tx1"/>
                 </a:solidFill>
               </a:rPr>
               <a:t>STOP</a:t>
             </a:r>
-            <a:endParaRPr lang="en-GB" dirty="0">
-              <a:solidFill>
-                <a:schemeClr val="tx1"/>
-              </a:solidFill>
-            </a:endParaRPr>
           </a:p>
         </p:txBody>
       </p:sp>
@@ -3648,81 +3621,26 @@
           <a:p>
             <a:pPr algn="ctr"/>
             <a:r>
-              <a:rPr lang="en-GB" sz="1200" dirty="0" smtClean="0">
+              <a:rPr lang="en-GB" sz="1200" dirty="0">
                 <a:solidFill>
                   <a:schemeClr val="tx1"/>
                 </a:solidFill>
               </a:rPr>
               <a:t>Train and validate new emulator on smaller NROY region</a:t>
             </a:r>
-            <a:endParaRPr lang="en-GB" sz="1200" dirty="0">
-              <a:solidFill>
-                <a:schemeClr val="tx1"/>
-              </a:solidFill>
-            </a:endParaRPr>
-          </a:p>
-        </p:txBody>
-      </p:sp>
-      <p:sp>
-        <p:nvSpPr>
-          <p:cNvPr id="25" name="Flowchart: Decision 24"/>
-          <p:cNvSpPr/>
-          <p:nvPr/>
-        </p:nvSpPr>
-        <p:spPr>
-          <a:xfrm>
-            <a:off x="1597811" y="8409000"/>
-            <a:ext cx="1251904" cy="1224000"/>
-          </a:xfrm>
-          <a:prstGeom prst="flowChartDecision">
-            <a:avLst/>
-          </a:prstGeom>
-          <a:solidFill>
-            <a:srgbClr val="F3A691"/>
-          </a:solidFill>
-          <a:ln w="19050">
-            <a:solidFill>
-              <a:schemeClr val="accent2">
-                <a:lumMod val="75000"/>
-              </a:schemeClr>
-            </a:solidFill>
-          </a:ln>
-        </p:spPr>
-        <p:style>
-          <a:lnRef idx="2">
-            <a:schemeClr val="accent1">
-              <a:shade val="50000"/>
-            </a:schemeClr>
-          </a:lnRef>
-          <a:fillRef idx="1">
-            <a:schemeClr val="accent1"/>
-          </a:fillRef>
-          <a:effectRef idx="0">
-            <a:schemeClr val="accent1"/>
-          </a:effectRef>
-          <a:fontRef idx="minor">
-            <a:schemeClr val="lt1"/>
-          </a:fontRef>
-        </p:style>
-        <p:txBody>
-          <a:bodyPr rtlCol="0" anchor="ctr"/>
-          <a:lstStyle/>
-          <a:p>
-            <a:pPr algn="ctr"/>
-            <a:endParaRPr lang="en-GB" dirty="0"/>
-          </a:p>
-        </p:txBody>
-      </p:sp>
-      <p:sp>
-        <p:nvSpPr>
-          <p:cNvPr id="26" name="TextBox 25"/>
+          </a:p>
+        </p:txBody>
+      </p:sp>
+      <p:sp>
+        <p:nvSpPr>
+          <p:cNvPr id="27" name="TextBox 26"/>
           <p:cNvSpPr txBox="1"/>
           <p:nvPr/>
         </p:nvSpPr>
         <p:spPr>
           <a:xfrm>
-            <a:off x="1681031" y="8626669"/>
-            <a:ext cx="1083938" cy="646331"/>
+            <a:off x="2820717" y="1806167"/>
+            <a:ext cx="1290376" cy="461665"/>
           </a:xfrm>
           <a:prstGeom prst="rect">
             <a:avLst/>
@@ -3737,23 +3655,22 @@
           <a:p>
             <a:pPr algn="ctr"/>
             <a:r>
-              <a:rPr lang="en-GB" sz="1200" dirty="0" smtClean="0"/>
-              <a:t>Is new emulator more precise?</a:t>
-            </a:r>
-            <a:endParaRPr lang="en-GB" sz="1200" dirty="0"/>
-          </a:p>
-        </p:txBody>
-      </p:sp>
-      <p:sp>
-        <p:nvSpPr>
-          <p:cNvPr id="27" name="TextBox 26"/>
+              <a:rPr lang="en-GB" sz="1200" dirty="0"/>
+              <a:t>Train and Validate Emulator</a:t>
+            </a:r>
+          </a:p>
+        </p:txBody>
+      </p:sp>
+      <p:sp>
+        <p:nvSpPr>
+          <p:cNvPr id="28" name="TextBox 27"/>
           <p:cNvSpPr txBox="1"/>
           <p:nvPr/>
         </p:nvSpPr>
         <p:spPr>
           <a:xfrm>
-            <a:off x="2820717" y="1806167"/>
-            <a:ext cx="1290376" cy="461665"/>
+            <a:off x="2710810" y="611832"/>
+            <a:ext cx="1510190" cy="461665"/>
           </a:xfrm>
           <a:prstGeom prst="rect">
             <a:avLst/>
@@ -3769,48 +3686,8 @@
             <a:pPr algn="ctr"/>
             <a:r>
               <a:rPr lang="en-GB" sz="1200" dirty="0"/>
-              <a:t>Train and Validate </a:t>
-            </a:r>
-            <a:r>
-              <a:rPr lang="en-GB" sz="1200" dirty="0" smtClean="0"/>
-              <a:t>Emulator</a:t>
-            </a:r>
-            <a:endParaRPr lang="en-GB" sz="1200" dirty="0"/>
-          </a:p>
-        </p:txBody>
-      </p:sp>
-      <p:sp>
-        <p:nvSpPr>
-          <p:cNvPr id="28" name="TextBox 27"/>
-          <p:cNvSpPr txBox="1"/>
-          <p:nvPr/>
-        </p:nvSpPr>
-        <p:spPr>
-          <a:xfrm>
-            <a:off x="2710810" y="611832"/>
-            <a:ext cx="1510190" cy="461665"/>
-          </a:xfrm>
-          <a:prstGeom prst="rect">
-            <a:avLst/>
-          </a:prstGeom>
-          <a:noFill/>
-        </p:spPr>
-        <p:txBody>
-          <a:bodyPr wrap="square" rtlCol="0">
-            <a:spAutoFit/>
-          </a:bodyPr>
-          <a:lstStyle/>
-          <a:p>
-            <a:pPr algn="ctr"/>
-            <a:r>
-              <a:rPr lang="en-GB" sz="1200" dirty="0"/>
-              <a:t>Create Experimental </a:t>
-            </a:r>
-            <a:r>
-              <a:rPr lang="en-GB" sz="1200" dirty="0" smtClean="0"/>
-              <a:t>Design</a:t>
-            </a:r>
-            <a:endParaRPr lang="en-GB" sz="1200" dirty="0"/>
+              <a:t>Create Experimental Design</a:t>
+            </a:r>
           </a:p>
         </p:txBody>
       </p:sp>
@@ -3981,18 +3858,13 @@
           <a:lstStyle/>
           <a:p>
             <a:r>
-              <a:rPr lang="en-GB" dirty="0" smtClean="0">
+              <a:rPr lang="en-GB" dirty="0">
                 <a:solidFill>
                   <a:srgbClr val="00B050"/>
                 </a:solidFill>
               </a:rPr>
               <a:t>YES</a:t>
             </a:r>
-            <a:endParaRPr lang="en-GB" dirty="0">
-              <a:solidFill>
-                <a:srgbClr val="00B050"/>
-              </a:solidFill>
-            </a:endParaRPr>
           </a:p>
         </p:txBody>
       </p:sp>
@@ -4055,206 +3927,13 @@
           <a:lstStyle/>
           <a:p>
             <a:r>
-              <a:rPr lang="en-GB" dirty="0" smtClean="0">
+              <a:rPr lang="en-GB" dirty="0">
                 <a:solidFill>
                   <a:srgbClr val="FF0000"/>
                 </a:solidFill>
               </a:rPr>
               <a:t>NO</a:t>
             </a:r>
-            <a:endParaRPr lang="en-GB" dirty="0">
-              <a:solidFill>
-                <a:srgbClr val="FF0000"/>
-              </a:solidFill>
-            </a:endParaRPr>
-          </a:p>
-        </p:txBody>
-      </p:sp>
-      <p:cxnSp>
-        <p:nvCxnSpPr>
-          <p:cNvPr id="70" name="Straight Arrow Connector 69"/>
-          <p:cNvCxnSpPr/>
-          <p:nvPr/>
-        </p:nvCxnSpPr>
-        <p:spPr>
-          <a:xfrm>
-            <a:off x="2222841" y="8049000"/>
-            <a:ext cx="0" cy="324835"/>
-          </a:xfrm>
-          <a:prstGeom prst="straightConnector1">
-            <a:avLst/>
-          </a:prstGeom>
-          <a:ln w="19050">
-            <a:solidFill>
-              <a:schemeClr val="tx1"/>
-            </a:solidFill>
-            <a:tailEnd type="triangle"/>
-          </a:ln>
-        </p:spPr>
-        <p:style>
-          <a:lnRef idx="1">
-            <a:schemeClr val="accent1"/>
-          </a:lnRef>
-          <a:fillRef idx="0">
-            <a:schemeClr val="accent1"/>
-          </a:fillRef>
-          <a:effectRef idx="0">
-            <a:schemeClr val="accent1"/>
-          </a:effectRef>
-          <a:fontRef idx="minor">
-            <a:schemeClr val="tx1"/>
-          </a:fontRef>
-        </p:style>
-      </p:cxnSp>
-      <p:cxnSp>
-        <p:nvCxnSpPr>
-          <p:cNvPr id="77" name="Elbow Connector 76"/>
-          <p:cNvCxnSpPr/>
-          <p:nvPr/>
-        </p:nvCxnSpPr>
-        <p:spPr>
-          <a:xfrm rot="5400000" flipH="1" flipV="1">
-            <a:off x="2705580" y="6828420"/>
-            <a:ext cx="2484000" cy="1901160"/>
-          </a:xfrm>
-          <a:prstGeom prst="bentConnector3">
-            <a:avLst>
-              <a:gd name="adj1" fmla="val -175"/>
-            </a:avLst>
-          </a:prstGeom>
-          <a:ln w="19050">
-            <a:solidFill>
-              <a:srgbClr val="FF0000"/>
-            </a:solidFill>
-            <a:tailEnd type="triangle"/>
-          </a:ln>
-        </p:spPr>
-        <p:style>
-          <a:lnRef idx="1">
-            <a:schemeClr val="accent1"/>
-          </a:lnRef>
-          <a:fillRef idx="0">
-            <a:schemeClr val="accent1"/>
-          </a:fillRef>
-          <a:effectRef idx="0">
-            <a:schemeClr val="accent1"/>
-          </a:effectRef>
-          <a:fontRef idx="minor">
-            <a:schemeClr val="tx1"/>
-          </a:fontRef>
-        </p:style>
-      </p:cxnSp>
-      <p:sp>
-        <p:nvSpPr>
-          <p:cNvPr id="82" name="TextBox 81"/>
-          <p:cNvSpPr txBox="1"/>
-          <p:nvPr/>
-        </p:nvSpPr>
-        <p:spPr>
-          <a:xfrm>
-            <a:off x="3445031" y="8687668"/>
-            <a:ext cx="487969" cy="369332"/>
-          </a:xfrm>
-          <a:prstGeom prst="rect">
-            <a:avLst/>
-          </a:prstGeom>
-          <a:noFill/>
-        </p:spPr>
-        <p:txBody>
-          <a:bodyPr wrap="square" rtlCol="0">
-            <a:spAutoFit/>
-          </a:bodyPr>
-          <a:lstStyle/>
-          <a:p>
-            <a:r>
-              <a:rPr lang="en-GB" dirty="0" smtClean="0">
-                <a:solidFill>
-                  <a:srgbClr val="FF0000"/>
-                </a:solidFill>
-              </a:rPr>
-              <a:t>NO</a:t>
-            </a:r>
-            <a:endParaRPr lang="en-GB" dirty="0">
-              <a:solidFill>
-                <a:srgbClr val="FF0000"/>
-              </a:solidFill>
-            </a:endParaRPr>
-          </a:p>
-        </p:txBody>
-      </p:sp>
-      <p:cxnSp>
-        <p:nvCxnSpPr>
-          <p:cNvPr id="88" name="Elbow Connector 87"/>
-          <p:cNvCxnSpPr/>
-          <p:nvPr/>
-        </p:nvCxnSpPr>
-        <p:spPr>
-          <a:xfrm rot="10800000">
-            <a:off x="1176023" y="3261000"/>
-            <a:ext cx="256048" cy="5796000"/>
-          </a:xfrm>
-          <a:prstGeom prst="bentConnector3">
-            <a:avLst>
-              <a:gd name="adj1" fmla="val 432772"/>
-            </a:avLst>
-          </a:prstGeom>
-          <a:ln w="19050">
-            <a:solidFill>
-              <a:schemeClr val="accent6"/>
-            </a:solidFill>
-            <a:tailEnd type="triangle"/>
-          </a:ln>
-        </p:spPr>
-        <p:style>
-          <a:lnRef idx="1">
-            <a:schemeClr val="accent1"/>
-          </a:lnRef>
-          <a:fillRef idx="0">
-            <a:schemeClr val="accent1"/>
-          </a:fillRef>
-          <a:effectRef idx="0">
-            <a:schemeClr val="accent1"/>
-          </a:effectRef>
-          <a:fontRef idx="minor">
-            <a:schemeClr val="tx1"/>
-          </a:fontRef>
-        </p:style>
-      </p:cxnSp>
-      <p:sp>
-        <p:nvSpPr>
-          <p:cNvPr id="90" name="TextBox 89"/>
-          <p:cNvSpPr txBox="1"/>
-          <p:nvPr/>
-        </p:nvSpPr>
-        <p:spPr>
-          <a:xfrm>
-            <a:off x="621000" y="8687668"/>
-            <a:ext cx="512641" cy="369332"/>
-          </a:xfrm>
-          <a:prstGeom prst="rect">
-            <a:avLst/>
-          </a:prstGeom>
-          <a:noFill/>
-        </p:spPr>
-        <p:txBody>
-          <a:bodyPr wrap="none" rtlCol="0">
-            <a:spAutoFit/>
-          </a:bodyPr>
-          <a:lstStyle/>
-          <a:p>
-            <a:r>
-              <a:rPr lang="en-GB" dirty="0" smtClean="0">
-                <a:solidFill>
-                  <a:srgbClr val="00B050"/>
-                </a:solidFill>
-              </a:rPr>
-              <a:t>YES</a:t>
-            </a:r>
-            <a:endParaRPr lang="en-GB" dirty="0">
-              <a:solidFill>
-                <a:srgbClr val="00B050"/>
-              </a:solidFill>
-            </a:endParaRPr>
           </a:p>
         </p:txBody>
       </p:sp>
@@ -4392,10 +4071,9 @@
           <a:lstStyle/>
           <a:p>
             <a:r>
-              <a:rPr lang="en-GB" sz="1050" dirty="0" smtClean="0"/>
+              <a:rPr lang="en-GB" sz="1050" dirty="0"/>
               <a:t>What for?</a:t>
             </a:r>
-            <a:endParaRPr lang="en-GB" sz="1050" dirty="0"/>
           </a:p>
         </p:txBody>
       </p:sp>
@@ -4460,13 +4138,101 @@
           <a:lstStyle/>
           <a:p>
             <a:r>
-              <a:rPr lang="en-GB" sz="1050" dirty="0" smtClean="0"/>
+              <a:rPr lang="en-GB" sz="1050" dirty="0"/>
               <a:t>What for?</a:t>
             </a:r>
-            <a:endParaRPr lang="en-GB" sz="1050" dirty="0"/>
-          </a:p>
-        </p:txBody>
-      </p:sp>
+          </a:p>
+        </p:txBody>
+      </p:sp>
+      <p:cxnSp>
+        <p:nvCxnSpPr>
+          <p:cNvPr id="54" name="Straight Arrow Connector 53">
+            <a:extLst>
+              <a:ext uri="{FF2B5EF4-FFF2-40B4-BE49-F238E27FC236}">
+                <a16:creationId xmlns:a16="http://schemas.microsoft.com/office/drawing/2014/main" id="{6472D476-A0A0-4AB4-BB6C-2E10A27A0C3F}"/>
+              </a:ext>
+            </a:extLst>
+          </p:cNvPr>
+          <p:cNvCxnSpPr/>
+          <p:nvPr/>
+        </p:nvCxnSpPr>
+        <p:spPr>
+          <a:xfrm>
+            <a:off x="698500" y="3225000"/>
+            <a:ext cx="533400" cy="0"/>
+          </a:xfrm>
+          <a:prstGeom prst="straightConnector1">
+            <a:avLst/>
+          </a:prstGeom>
+          <a:ln w="12700">
+            <a:solidFill>
+              <a:schemeClr val="tx1"/>
+            </a:solidFill>
+            <a:prstDash val="dash"/>
+            <a:tailEnd type="triangle"/>
+          </a:ln>
+        </p:spPr>
+        <p:style>
+          <a:lnRef idx="1">
+            <a:schemeClr val="accent1"/>
+          </a:lnRef>
+          <a:fillRef idx="0">
+            <a:schemeClr val="accent1"/>
+          </a:fillRef>
+          <a:effectRef idx="0">
+            <a:schemeClr val="accent1"/>
+          </a:effectRef>
+          <a:fontRef idx="minor">
+            <a:schemeClr val="tx1"/>
+          </a:fontRef>
+        </p:style>
+      </p:cxnSp>
+      <p:cxnSp>
+        <p:nvCxnSpPr>
+          <p:cNvPr id="56" name="Connector: Elbow 55">
+            <a:extLst>
+              <a:ext uri="{FF2B5EF4-FFF2-40B4-BE49-F238E27FC236}">
+                <a16:creationId xmlns:a16="http://schemas.microsoft.com/office/drawing/2014/main" id="{A090BB69-E503-4A7D-B652-05A7D59B17AF}"/>
+              </a:ext>
+            </a:extLst>
+          </p:cNvPr>
+          <p:cNvCxnSpPr>
+            <a:cxnSpLocks/>
+          </p:cNvCxnSpPr>
+          <p:nvPr/>
+        </p:nvCxnSpPr>
+        <p:spPr>
+          <a:xfrm rot="16200000" flipH="1">
+            <a:off x="-1230800" y="5154300"/>
+            <a:ext cx="4392000" cy="533400"/>
+          </a:xfrm>
+          <a:prstGeom prst="bentConnector3">
+            <a:avLst>
+              <a:gd name="adj1" fmla="val 99924"/>
+            </a:avLst>
+          </a:prstGeom>
+          <a:ln w="12700">
+            <a:solidFill>
+              <a:schemeClr val="tx1"/>
+            </a:solidFill>
+            <a:prstDash val="dash"/>
+          </a:ln>
+        </p:spPr>
+        <p:style>
+          <a:lnRef idx="1">
+            <a:schemeClr val="accent1"/>
+          </a:lnRef>
+          <a:fillRef idx="0">
+            <a:schemeClr val="accent1"/>
+          </a:fillRef>
+          <a:effectRef idx="0">
+            <a:schemeClr val="accent1"/>
+          </a:effectRef>
+          <a:fontRef idx="minor">
+            <a:schemeClr val="tx1"/>
+          </a:fontRef>
+        </p:style>
+      </p:cxnSp>
     </p:spTree>
     <p:extLst>
       <p:ext uri="{BB962C8B-B14F-4D97-AF65-F5344CB8AC3E}">

</xml_diff>